<commit_message>
Add tcsa, nsleds, hdiled ratio comparison
</commit_message>
<xml_diff>
--- a/fig/nsleds_hdiled_quads.pptx
+++ b/fig/nsleds_hdiled_quads.pptx
@@ -5,8 +5,7 @@
     <p:sldMasterId id="2147483648" r:id="rId1"/>
   </p:sldMasterIdLst>
   <p:sldIdLst>
-    <p:sldId id="256" r:id="rId2"/>
-    <p:sldId id="257" r:id="rId3"/>
+    <p:sldId id="257" r:id="rId2"/>
   </p:sldIdLst>
   <p:sldSz cx="12192000" cy="6858000"/>
   <p:notesSz cx="6858000" cy="9144000"/>
@@ -105,6 +104,11 @@
       </a:defRPr>
     </a:lvl9pPr>
   </p:defaultTextStyle>
+  <p:extLst>
+    <p:ext uri="{EFAFB233-063F-42B5-8137-9DF3F51BA10A}">
+      <p15:sldGuideLst xmlns:p15="http://schemas.microsoft.com/office/powerpoint/2012/main"/>
+    </p:ext>
+  </p:extLst>
 </p:presentation>
 </file>
 
@@ -3324,90 +3328,10 @@
       </p:grpSpPr>
       <p:sp>
         <p:nvSpPr>
-          <p:cNvPr id="2" name="Title 1">
-            <a:extLst>
-              <a:ext uri="{FF2B5EF4-FFF2-40B4-BE49-F238E27FC236}">
-                <a16:creationId xmlns:a16="http://schemas.microsoft.com/office/drawing/2014/main" id="{55475239-C062-4B1B-ACFF-C312F324874E}"/>
-              </a:ext>
-            </a:extLst>
-          </p:cNvPr>
-          <p:cNvSpPr>
-            <a:spLocks noGrp="1"/>
-          </p:cNvSpPr>
-          <p:nvPr>
-            <p:ph type="ctrTitle"/>
-          </p:nvPr>
-        </p:nvSpPr>
-        <p:spPr/>
-        <p:txBody>
-          <a:bodyPr/>
-          <a:lstStyle/>
-          <a:p>
-            <a:endParaRPr lang="en-US"/>
-          </a:p>
-        </p:txBody>
-      </p:sp>
-      <p:sp>
-        <p:nvSpPr>
-          <p:cNvPr id="3" name="Subtitle 2">
-            <a:extLst>
-              <a:ext uri="{FF2B5EF4-FFF2-40B4-BE49-F238E27FC236}">
-                <a16:creationId xmlns:a16="http://schemas.microsoft.com/office/drawing/2014/main" id="{E9226032-D3F1-4A40-BC7B-A086CE8F2743}"/>
-              </a:ext>
-            </a:extLst>
-          </p:cNvPr>
-          <p:cNvSpPr>
-            <a:spLocks noGrp="1"/>
-          </p:cNvSpPr>
-          <p:nvPr>
-            <p:ph type="subTitle" idx="1"/>
-          </p:nvPr>
-        </p:nvSpPr>
-        <p:spPr/>
-        <p:txBody>
-          <a:bodyPr/>
-          <a:lstStyle/>
-          <a:p>
-            <a:endParaRPr lang="en-US"/>
-          </a:p>
-        </p:txBody>
-      </p:sp>
-    </p:spTree>
-    <p:extLst>
-      <p:ext uri="{BB962C8B-B14F-4D97-AF65-F5344CB8AC3E}">
-        <p14:creationId xmlns:p14="http://schemas.microsoft.com/office/powerpoint/2010/main" val="3109520717"/>
-      </p:ext>
-    </p:extLst>
-  </p:cSld>
-  <p:clrMapOvr>
-    <a:masterClrMapping/>
-  </p:clrMapOvr>
-</p:sld>
-</file>
-
-<file path=ppt/slides/slide2.xml><?xml version="1.0" encoding="utf-8"?>
-<p:sld xmlns:a="http://schemas.openxmlformats.org/drawingml/2006/main" xmlns:r="http://schemas.openxmlformats.org/officeDocument/2006/relationships" xmlns:p="http://schemas.openxmlformats.org/presentationml/2006/main">
-  <p:cSld>
-    <p:spTree>
-      <p:nvGrpSpPr>
-        <p:cNvPr id="1" name=""/>
-        <p:cNvGrpSpPr/>
-        <p:nvPr/>
-      </p:nvGrpSpPr>
-      <p:grpSpPr>
-        <a:xfrm>
-          <a:off x="0" y="0"/>
-          <a:ext cx="0" cy="0"/>
-          <a:chOff x="0" y="0"/>
-          <a:chExt cx="0" cy="0"/>
-        </a:xfrm>
-      </p:grpSpPr>
-      <p:sp>
-        <p:nvSpPr>
-          <p:cNvPr id="4" name="Rectangle 3">
-            <a:extLst>
-              <a:ext uri="{FF2B5EF4-FFF2-40B4-BE49-F238E27FC236}">
-                <a16:creationId xmlns:a16="http://schemas.microsoft.com/office/drawing/2014/main" id="{1CE2FFF5-6CFF-408A-9573-E892EE9BC0F7}"/>
+          <p:cNvPr id="156" name="Rectangle 155">
+            <a:extLst>
+              <a:ext uri="{FF2B5EF4-FFF2-40B4-BE49-F238E27FC236}">
+                <a16:creationId xmlns:a16="http://schemas.microsoft.com/office/drawing/2014/main" id="{84976FAC-5AAA-4D79-9F79-6FDD2625BA3A}"/>
               </a:ext>
             </a:extLst>
           </p:cNvPr>
@@ -3416,12 +3340,15 @@
         </p:nvSpPr>
         <p:spPr>
           <a:xfrm>
-            <a:off x="751562" y="844463"/>
+            <a:off x="6468370" y="844463"/>
             <a:ext cx="5169074" cy="5169074"/>
           </a:xfrm>
           <a:prstGeom prst="rect">
             <a:avLst/>
           </a:prstGeom>
+          <a:solidFill>
+            <a:schemeClr val="accent4"/>
+          </a:solidFill>
           <a:ln w="47625"/>
         </p:spPr>
         <p:style>
@@ -3451,10 +3378,10 @@
       </p:sp>
       <p:sp>
         <p:nvSpPr>
-          <p:cNvPr id="5" name="Rectangle 4">
-            <a:extLst>
-              <a:ext uri="{FF2B5EF4-FFF2-40B4-BE49-F238E27FC236}">
-                <a16:creationId xmlns:a16="http://schemas.microsoft.com/office/drawing/2014/main" id="{6AEF2BF4-48CC-417D-80C8-E071987DAEDE}"/>
+          <p:cNvPr id="4" name="Rectangle 3">
+            <a:extLst>
+              <a:ext uri="{FF2B5EF4-FFF2-40B4-BE49-F238E27FC236}">
+                <a16:creationId xmlns:a16="http://schemas.microsoft.com/office/drawing/2014/main" id="{1CE2FFF5-6CFF-408A-9573-E892EE9BC0F7}"/>
               </a:ext>
             </a:extLst>
           </p:cNvPr>
@@ -3463,12 +3390,16 @@
         </p:nvSpPr>
         <p:spPr>
           <a:xfrm>
-            <a:off x="6271364" y="844463"/>
+            <a:off x="562072" y="844463"/>
             <a:ext cx="5169074" cy="5169074"/>
           </a:xfrm>
           <a:prstGeom prst="rect">
             <a:avLst/>
           </a:prstGeom>
+          <a:solidFill>
+            <a:schemeClr val="accent6"/>
+          </a:solidFill>
+          <a:ln w="47625"/>
         </p:spPr>
         <p:style>
           <a:lnRef idx="2">
@@ -3513,54 +3444,19 @@
         </p:nvCxnSpPr>
         <p:spPr>
           <a:xfrm>
-            <a:off x="3336099" y="844463"/>
+            <a:off x="3146609" y="844463"/>
             <a:ext cx="0" cy="5169074"/>
           </a:xfrm>
           <a:prstGeom prst="line">
             <a:avLst/>
           </a:prstGeom>
-          <a:ln w="76200"/>
-        </p:spPr>
-        <p:style>
-          <a:lnRef idx="2">
-            <a:schemeClr val="accent2"/>
-          </a:lnRef>
-          <a:fillRef idx="0">
-            <a:schemeClr val="accent2"/>
-          </a:fillRef>
-          <a:effectRef idx="1">
-            <a:schemeClr val="accent2"/>
-          </a:effectRef>
-          <a:fontRef idx="minor">
-            <a:schemeClr val="tx1"/>
-          </a:fontRef>
-        </p:style>
-      </p:cxnSp>
-      <p:cxnSp>
-        <p:nvCxnSpPr>
-          <p:cNvPr id="8" name="Straight Connector 7">
-            <a:extLst>
-              <a:ext uri="{FF2B5EF4-FFF2-40B4-BE49-F238E27FC236}">
-                <a16:creationId xmlns:a16="http://schemas.microsoft.com/office/drawing/2014/main" id="{2341B732-884A-438A-953C-E6F04D88215A}"/>
-              </a:ext>
-            </a:extLst>
-          </p:cNvPr>
-          <p:cNvCxnSpPr>
-            <a:cxnSpLocks/>
-            <a:stCxn id="5" idx="0"/>
-            <a:endCxn id="5" idx="2"/>
-          </p:cNvCxnSpPr>
-          <p:nvPr/>
-        </p:nvCxnSpPr>
-        <p:spPr>
-          <a:xfrm>
-            <a:off x="8855901" y="844463"/>
-            <a:ext cx="0" cy="5169074"/>
-          </a:xfrm>
-          <a:prstGeom prst="line">
-            <a:avLst/>
-          </a:prstGeom>
-          <a:ln w="76200"/>
+          <a:ln w="50800">
+            <a:solidFill>
+              <a:schemeClr val="accent1">
+                <a:lumMod val="50000"/>
+              </a:schemeClr>
+            </a:solidFill>
+          </a:ln>
         </p:spPr>
         <p:style>
           <a:lnRef idx="2">
@@ -3595,13 +3491,924 @@
         </p:nvCxnSpPr>
         <p:spPr>
           <a:xfrm flipH="1">
-            <a:off x="751562" y="3429000"/>
+            <a:off x="562072" y="3429000"/>
             <a:ext cx="5169074" cy="0"/>
           </a:xfrm>
           <a:prstGeom prst="line">
             <a:avLst/>
           </a:prstGeom>
-          <a:ln w="76200"/>
+          <a:ln w="50800">
+            <a:solidFill>
+              <a:schemeClr val="accent1">
+                <a:lumMod val="50000"/>
+              </a:schemeClr>
+            </a:solidFill>
+          </a:ln>
+        </p:spPr>
+        <p:style>
+          <a:lnRef idx="2">
+            <a:schemeClr val="accent2"/>
+          </a:lnRef>
+          <a:fillRef idx="0">
+            <a:schemeClr val="accent2"/>
+          </a:fillRef>
+          <a:effectRef idx="1">
+            <a:schemeClr val="accent2"/>
+          </a:effectRef>
+          <a:fontRef idx="minor">
+            <a:schemeClr val="tx1"/>
+          </a:fontRef>
+        </p:style>
+      </p:cxnSp>
+      <p:sp>
+        <p:nvSpPr>
+          <p:cNvPr id="18" name="TextBox 17">
+            <a:extLst>
+              <a:ext uri="{FF2B5EF4-FFF2-40B4-BE49-F238E27FC236}">
+                <a16:creationId xmlns:a16="http://schemas.microsoft.com/office/drawing/2014/main" id="{06B9ED30-8FFA-49FC-8E36-5CFB09C1B8A8}"/>
+              </a:ext>
+            </a:extLst>
+          </p:cNvPr>
+          <p:cNvSpPr txBox="1"/>
+          <p:nvPr/>
+        </p:nvSpPr>
+        <p:spPr>
+          <a:xfrm>
+            <a:off x="1367915" y="1675067"/>
+            <a:ext cx="1427966" cy="923330"/>
+          </a:xfrm>
+          <a:prstGeom prst="rect">
+            <a:avLst/>
+          </a:prstGeom>
+          <a:noFill/>
+        </p:spPr>
+        <p:txBody>
+          <a:bodyPr wrap="square" rtlCol="0">
+            <a:spAutoFit/>
+          </a:bodyPr>
+          <a:lstStyle/>
+          <a:p>
+            <a:r>
+              <a:rPr lang="en-US" sz="5400" dirty="0">
+                <a:solidFill>
+                  <a:schemeClr val="tx1">
+                    <a:lumMod val="95000"/>
+                    <a:lumOff val="5000"/>
+                  </a:schemeClr>
+                </a:solidFill>
+              </a:rPr>
+              <a:t>Q1</a:t>
+            </a:r>
+          </a:p>
+        </p:txBody>
+      </p:sp>
+      <p:sp>
+        <p:nvSpPr>
+          <p:cNvPr id="19" name="TextBox 18">
+            <a:extLst>
+              <a:ext uri="{FF2B5EF4-FFF2-40B4-BE49-F238E27FC236}">
+                <a16:creationId xmlns:a16="http://schemas.microsoft.com/office/drawing/2014/main" id="{BC443B8A-6304-4457-8D16-453E4B49F009}"/>
+              </a:ext>
+            </a:extLst>
+          </p:cNvPr>
+          <p:cNvSpPr txBox="1"/>
+          <p:nvPr/>
+        </p:nvSpPr>
+        <p:spPr>
+          <a:xfrm>
+            <a:off x="3601724" y="1675067"/>
+            <a:ext cx="1427966" cy="923330"/>
+          </a:xfrm>
+          <a:prstGeom prst="rect">
+            <a:avLst/>
+          </a:prstGeom>
+          <a:noFill/>
+        </p:spPr>
+        <p:txBody>
+          <a:bodyPr wrap="square" rtlCol="0">
+            <a:spAutoFit/>
+          </a:bodyPr>
+          <a:lstStyle/>
+          <a:p>
+            <a:r>
+              <a:rPr lang="en-US" sz="5400" dirty="0">
+                <a:solidFill>
+                  <a:schemeClr val="tx1">
+                    <a:lumMod val="95000"/>
+                    <a:lumOff val="5000"/>
+                  </a:schemeClr>
+                </a:solidFill>
+              </a:rPr>
+              <a:t>Q2</a:t>
+            </a:r>
+          </a:p>
+        </p:txBody>
+      </p:sp>
+      <p:sp>
+        <p:nvSpPr>
+          <p:cNvPr id="21" name="TextBox 20">
+            <a:extLst>
+              <a:ext uri="{FF2B5EF4-FFF2-40B4-BE49-F238E27FC236}">
+                <a16:creationId xmlns:a16="http://schemas.microsoft.com/office/drawing/2014/main" id="{C66C1388-2A33-45C8-B5B5-19096DB98A0A}"/>
+              </a:ext>
+            </a:extLst>
+          </p:cNvPr>
+          <p:cNvSpPr txBox="1"/>
+          <p:nvPr/>
+        </p:nvSpPr>
+        <p:spPr>
+          <a:xfrm>
+            <a:off x="1367915" y="4259604"/>
+            <a:ext cx="1427966" cy="923330"/>
+          </a:xfrm>
+          <a:prstGeom prst="rect">
+            <a:avLst/>
+          </a:prstGeom>
+          <a:noFill/>
+        </p:spPr>
+        <p:txBody>
+          <a:bodyPr wrap="square" rtlCol="0">
+            <a:spAutoFit/>
+          </a:bodyPr>
+          <a:lstStyle/>
+          <a:p>
+            <a:r>
+              <a:rPr lang="en-US" sz="5400" dirty="0">
+                <a:solidFill>
+                  <a:schemeClr val="tx1">
+                    <a:lumMod val="95000"/>
+                    <a:lumOff val="5000"/>
+                  </a:schemeClr>
+                </a:solidFill>
+              </a:rPr>
+              <a:t>Q3</a:t>
+            </a:r>
+          </a:p>
+        </p:txBody>
+      </p:sp>
+      <p:sp>
+        <p:nvSpPr>
+          <p:cNvPr id="22" name="TextBox 21">
+            <a:extLst>
+              <a:ext uri="{FF2B5EF4-FFF2-40B4-BE49-F238E27FC236}">
+                <a16:creationId xmlns:a16="http://schemas.microsoft.com/office/drawing/2014/main" id="{E62390B0-6D00-4E07-92EB-1783E9042A87}"/>
+              </a:ext>
+            </a:extLst>
+          </p:cNvPr>
+          <p:cNvSpPr txBox="1"/>
+          <p:nvPr/>
+        </p:nvSpPr>
+        <p:spPr>
+          <a:xfrm>
+            <a:off x="3601724" y="4259604"/>
+            <a:ext cx="1427966" cy="923330"/>
+          </a:xfrm>
+          <a:prstGeom prst="rect">
+            <a:avLst/>
+          </a:prstGeom>
+          <a:noFill/>
+        </p:spPr>
+        <p:txBody>
+          <a:bodyPr wrap="square" rtlCol="0">
+            <a:spAutoFit/>
+          </a:bodyPr>
+          <a:lstStyle/>
+          <a:p>
+            <a:r>
+              <a:rPr lang="en-US" sz="5400" dirty="0">
+                <a:solidFill>
+                  <a:schemeClr val="tx1">
+                    <a:lumMod val="95000"/>
+                    <a:lumOff val="5000"/>
+                  </a:schemeClr>
+                </a:solidFill>
+              </a:rPr>
+              <a:t>Q4</a:t>
+            </a:r>
+          </a:p>
+        </p:txBody>
+      </p:sp>
+      <p:sp>
+        <p:nvSpPr>
+          <p:cNvPr id="23" name="TextBox 22">
+            <a:extLst>
+              <a:ext uri="{FF2B5EF4-FFF2-40B4-BE49-F238E27FC236}">
+                <a16:creationId xmlns:a16="http://schemas.microsoft.com/office/drawing/2014/main" id="{7E32F7F6-BC53-4EE8-BB1C-C7E56ACB4A98}"/>
+              </a:ext>
+            </a:extLst>
+          </p:cNvPr>
+          <p:cNvSpPr txBox="1"/>
+          <p:nvPr/>
+        </p:nvSpPr>
+        <p:spPr>
+          <a:xfrm>
+            <a:off x="1939389" y="0"/>
+            <a:ext cx="2561920" cy="1015663"/>
+          </a:xfrm>
+          <a:prstGeom prst="rect">
+            <a:avLst/>
+          </a:prstGeom>
+          <a:noFill/>
+        </p:spPr>
+        <p:txBody>
+          <a:bodyPr wrap="none" rtlCol="0">
+            <a:spAutoFit/>
+          </a:bodyPr>
+          <a:lstStyle/>
+          <a:p>
+            <a:r>
+              <a:rPr lang="en-US" sz="6000" dirty="0"/>
+              <a:t>NSLEDS</a:t>
+            </a:r>
+          </a:p>
+        </p:txBody>
+      </p:sp>
+      <p:sp>
+        <p:nvSpPr>
+          <p:cNvPr id="24" name="TextBox 23">
+            <a:extLst>
+              <a:ext uri="{FF2B5EF4-FFF2-40B4-BE49-F238E27FC236}">
+                <a16:creationId xmlns:a16="http://schemas.microsoft.com/office/drawing/2014/main" id="{8DA04338-6912-4E20-9DE1-EB82B362D0DA}"/>
+              </a:ext>
+            </a:extLst>
+          </p:cNvPr>
+          <p:cNvSpPr txBox="1"/>
+          <p:nvPr/>
+        </p:nvSpPr>
+        <p:spPr>
+          <a:xfrm>
+            <a:off x="7764431" y="0"/>
+            <a:ext cx="2502608" cy="1015663"/>
+          </a:xfrm>
+          <a:prstGeom prst="rect">
+            <a:avLst/>
+          </a:prstGeom>
+          <a:noFill/>
+        </p:spPr>
+        <p:txBody>
+          <a:bodyPr wrap="none" rtlCol="0">
+            <a:spAutoFit/>
+          </a:bodyPr>
+          <a:lstStyle/>
+          <a:p>
+            <a:r>
+              <a:rPr lang="en-US" sz="6000" dirty="0"/>
+              <a:t>HDILED</a:t>
+            </a:r>
+          </a:p>
+        </p:txBody>
+      </p:sp>
+      <p:cxnSp>
+        <p:nvCxnSpPr>
+          <p:cNvPr id="26" name="Straight Arrow Connector 25">
+            <a:extLst>
+              <a:ext uri="{FF2B5EF4-FFF2-40B4-BE49-F238E27FC236}">
+                <a16:creationId xmlns:a16="http://schemas.microsoft.com/office/drawing/2014/main" id="{DBCB53F8-908F-44C1-BF60-EA0A1267EF47}"/>
+              </a:ext>
+            </a:extLst>
+          </p:cNvPr>
+          <p:cNvCxnSpPr>
+            <a:cxnSpLocks/>
+          </p:cNvCxnSpPr>
+          <p:nvPr/>
+        </p:nvCxnSpPr>
+        <p:spPr>
+          <a:xfrm>
+            <a:off x="562072" y="6154664"/>
+            <a:ext cx="5169074" cy="0"/>
+          </a:xfrm>
+          <a:prstGeom prst="straightConnector1">
+            <a:avLst/>
+          </a:prstGeom>
+          <a:ln w="38100">
+            <a:headEnd type="triangle"/>
+            <a:tailEnd type="triangle"/>
+          </a:ln>
+        </p:spPr>
+        <p:style>
+          <a:lnRef idx="1">
+            <a:schemeClr val="dk1"/>
+          </a:lnRef>
+          <a:fillRef idx="0">
+            <a:schemeClr val="dk1"/>
+          </a:fillRef>
+          <a:effectRef idx="0">
+            <a:schemeClr val="dk1"/>
+          </a:effectRef>
+          <a:fontRef idx="minor">
+            <a:schemeClr val="tx1"/>
+          </a:fontRef>
+        </p:style>
+      </p:cxnSp>
+      <p:cxnSp>
+        <p:nvCxnSpPr>
+          <p:cNvPr id="29" name="Straight Arrow Connector 28">
+            <a:extLst>
+              <a:ext uri="{FF2B5EF4-FFF2-40B4-BE49-F238E27FC236}">
+                <a16:creationId xmlns:a16="http://schemas.microsoft.com/office/drawing/2014/main" id="{EA22759E-7280-4027-9EA6-573BC41894E0}"/>
+              </a:ext>
+            </a:extLst>
+          </p:cNvPr>
+          <p:cNvCxnSpPr>
+            <a:cxnSpLocks/>
+          </p:cNvCxnSpPr>
+          <p:nvPr/>
+        </p:nvCxnSpPr>
+        <p:spPr>
+          <a:xfrm>
+            <a:off x="443075" y="844463"/>
+            <a:ext cx="0" cy="5169074"/>
+          </a:xfrm>
+          <a:prstGeom prst="straightConnector1">
+            <a:avLst/>
+          </a:prstGeom>
+          <a:ln w="38100">
+            <a:headEnd type="triangle"/>
+            <a:tailEnd type="triangle"/>
+          </a:ln>
+        </p:spPr>
+        <p:style>
+          <a:lnRef idx="1">
+            <a:schemeClr val="dk1"/>
+          </a:lnRef>
+          <a:fillRef idx="0">
+            <a:schemeClr val="dk1"/>
+          </a:fillRef>
+          <a:effectRef idx="0">
+            <a:schemeClr val="dk1"/>
+          </a:effectRef>
+          <a:fontRef idx="minor">
+            <a:schemeClr val="tx1"/>
+          </a:fontRef>
+        </p:style>
+      </p:cxnSp>
+      <p:sp>
+        <p:nvSpPr>
+          <p:cNvPr id="32" name="TextBox 31">
+            <a:extLst>
+              <a:ext uri="{FF2B5EF4-FFF2-40B4-BE49-F238E27FC236}">
+                <a16:creationId xmlns:a16="http://schemas.microsoft.com/office/drawing/2014/main" id="{8025E061-C92D-4ECA-B360-3B052FC9CF78}"/>
+              </a:ext>
+            </a:extLst>
+          </p:cNvPr>
+          <p:cNvSpPr txBox="1"/>
+          <p:nvPr/>
+        </p:nvSpPr>
+        <p:spPr>
+          <a:xfrm rot="16200000">
+            <a:off x="-131574" y="3198167"/>
+            <a:ext cx="806631" cy="461665"/>
+          </a:xfrm>
+          <a:prstGeom prst="rect">
+            <a:avLst/>
+          </a:prstGeom>
+          <a:noFill/>
+        </p:spPr>
+        <p:txBody>
+          <a:bodyPr wrap="none" rtlCol="0">
+            <a:spAutoFit/>
+          </a:bodyPr>
+          <a:lstStyle/>
+          <a:p>
+            <a:r>
+              <a:rPr lang="en-US" sz="2400" dirty="0"/>
+              <a:t>1024</a:t>
+            </a:r>
+          </a:p>
+        </p:txBody>
+      </p:sp>
+      <p:sp>
+        <p:nvSpPr>
+          <p:cNvPr id="33" name="TextBox 32">
+            <a:extLst>
+              <a:ext uri="{FF2B5EF4-FFF2-40B4-BE49-F238E27FC236}">
+                <a16:creationId xmlns:a16="http://schemas.microsoft.com/office/drawing/2014/main" id="{7FA4C87D-B1B7-4AF0-A368-6645A8032AAB}"/>
+              </a:ext>
+            </a:extLst>
+          </p:cNvPr>
+          <p:cNvSpPr txBox="1"/>
+          <p:nvPr/>
+        </p:nvSpPr>
+        <p:spPr>
+          <a:xfrm>
+            <a:off x="2749123" y="6120217"/>
+            <a:ext cx="806631" cy="461665"/>
+          </a:xfrm>
+          <a:prstGeom prst="rect">
+            <a:avLst/>
+          </a:prstGeom>
+          <a:noFill/>
+        </p:spPr>
+        <p:txBody>
+          <a:bodyPr wrap="none" rtlCol="0">
+            <a:spAutoFit/>
+          </a:bodyPr>
+          <a:lstStyle/>
+          <a:p>
+            <a:r>
+              <a:rPr lang="en-US" sz="2400" dirty="0"/>
+              <a:t>1024</a:t>
+            </a:r>
+          </a:p>
+        </p:txBody>
+      </p:sp>
+      <p:cxnSp>
+        <p:nvCxnSpPr>
+          <p:cNvPr id="34" name="Straight Arrow Connector 33">
+            <a:extLst>
+              <a:ext uri="{FF2B5EF4-FFF2-40B4-BE49-F238E27FC236}">
+                <a16:creationId xmlns:a16="http://schemas.microsoft.com/office/drawing/2014/main" id="{6B508208-E172-467A-9D6E-26472B6119FF}"/>
+              </a:ext>
+            </a:extLst>
+          </p:cNvPr>
+          <p:cNvCxnSpPr>
+            <a:cxnSpLocks/>
+          </p:cNvCxnSpPr>
+          <p:nvPr/>
+        </p:nvCxnSpPr>
+        <p:spPr>
+          <a:xfrm>
+            <a:off x="581905" y="3276600"/>
+            <a:ext cx="2518702" cy="0"/>
+          </a:xfrm>
+          <a:prstGeom prst="straightConnector1">
+            <a:avLst/>
+          </a:prstGeom>
+          <a:ln w="38100">
+            <a:headEnd type="triangle"/>
+            <a:tailEnd type="triangle"/>
+          </a:ln>
+        </p:spPr>
+        <p:style>
+          <a:lnRef idx="1">
+            <a:schemeClr val="dk1"/>
+          </a:lnRef>
+          <a:fillRef idx="0">
+            <a:schemeClr val="dk1"/>
+          </a:fillRef>
+          <a:effectRef idx="0">
+            <a:schemeClr val="dk1"/>
+          </a:effectRef>
+          <a:fontRef idx="minor">
+            <a:schemeClr val="tx1"/>
+          </a:fontRef>
+        </p:style>
+      </p:cxnSp>
+      <p:sp>
+        <p:nvSpPr>
+          <p:cNvPr id="39" name="TextBox 38">
+            <a:extLst>
+              <a:ext uri="{FF2B5EF4-FFF2-40B4-BE49-F238E27FC236}">
+                <a16:creationId xmlns:a16="http://schemas.microsoft.com/office/drawing/2014/main" id="{3DCBDF0A-1EA9-465F-802E-804976EAA2A9}"/>
+              </a:ext>
+            </a:extLst>
+          </p:cNvPr>
+          <p:cNvSpPr txBox="1"/>
+          <p:nvPr/>
+        </p:nvSpPr>
+        <p:spPr>
+          <a:xfrm>
+            <a:off x="1462333" y="2885744"/>
+            <a:ext cx="651140" cy="461665"/>
+          </a:xfrm>
+          <a:prstGeom prst="rect">
+            <a:avLst/>
+          </a:prstGeom>
+          <a:noFill/>
+        </p:spPr>
+        <p:txBody>
+          <a:bodyPr wrap="none" rtlCol="0">
+            <a:spAutoFit/>
+          </a:bodyPr>
+          <a:lstStyle/>
+          <a:p>
+            <a:r>
+              <a:rPr lang="en-US" sz="2400" dirty="0"/>
+              <a:t>512</a:t>
+            </a:r>
+          </a:p>
+        </p:txBody>
+      </p:sp>
+      <p:cxnSp>
+        <p:nvCxnSpPr>
+          <p:cNvPr id="40" name="Straight Arrow Connector 39">
+            <a:extLst>
+              <a:ext uri="{FF2B5EF4-FFF2-40B4-BE49-F238E27FC236}">
+                <a16:creationId xmlns:a16="http://schemas.microsoft.com/office/drawing/2014/main" id="{D62D9623-E34B-4C5F-BF3A-14938EBA7C19}"/>
+              </a:ext>
+            </a:extLst>
+          </p:cNvPr>
+          <p:cNvCxnSpPr>
+            <a:cxnSpLocks/>
+          </p:cNvCxnSpPr>
+          <p:nvPr/>
+        </p:nvCxnSpPr>
+        <p:spPr>
+          <a:xfrm>
+            <a:off x="2965951" y="3469700"/>
+            <a:ext cx="0" cy="2522100"/>
+          </a:xfrm>
+          <a:prstGeom prst="straightConnector1">
+            <a:avLst/>
+          </a:prstGeom>
+          <a:ln w="38100">
+            <a:headEnd type="triangle"/>
+            <a:tailEnd type="triangle"/>
+          </a:ln>
+        </p:spPr>
+        <p:style>
+          <a:lnRef idx="1">
+            <a:schemeClr val="dk1"/>
+          </a:lnRef>
+          <a:fillRef idx="0">
+            <a:schemeClr val="dk1"/>
+          </a:fillRef>
+          <a:effectRef idx="0">
+            <a:schemeClr val="dk1"/>
+          </a:effectRef>
+          <a:fontRef idx="minor">
+            <a:schemeClr val="tx1"/>
+          </a:fontRef>
+        </p:style>
+      </p:cxnSp>
+      <p:sp>
+        <p:nvSpPr>
+          <p:cNvPr id="47" name="TextBox 46">
+            <a:extLst>
+              <a:ext uri="{FF2B5EF4-FFF2-40B4-BE49-F238E27FC236}">
+                <a16:creationId xmlns:a16="http://schemas.microsoft.com/office/drawing/2014/main" id="{185C6769-3FD4-4507-ADEA-E68ED067EA96}"/>
+              </a:ext>
+            </a:extLst>
+          </p:cNvPr>
+          <p:cNvSpPr txBox="1"/>
+          <p:nvPr/>
+        </p:nvSpPr>
+        <p:spPr>
+          <a:xfrm rot="16200000">
+            <a:off x="2451377" y="4514630"/>
+            <a:ext cx="651140" cy="461665"/>
+          </a:xfrm>
+          <a:prstGeom prst="rect">
+            <a:avLst/>
+          </a:prstGeom>
+          <a:noFill/>
+        </p:spPr>
+        <p:txBody>
+          <a:bodyPr wrap="none" rtlCol="0">
+            <a:spAutoFit/>
+          </a:bodyPr>
+          <a:lstStyle/>
+          <a:p>
+            <a:r>
+              <a:rPr lang="en-US" sz="2400" dirty="0"/>
+              <a:t>512</a:t>
+            </a:r>
+          </a:p>
+        </p:txBody>
+      </p:sp>
+      <p:cxnSp>
+        <p:nvCxnSpPr>
+          <p:cNvPr id="53" name="Straight Connector 52">
+            <a:extLst>
+              <a:ext uri="{FF2B5EF4-FFF2-40B4-BE49-F238E27FC236}">
+                <a16:creationId xmlns:a16="http://schemas.microsoft.com/office/drawing/2014/main" id="{4EA2669F-1093-40D2-98B3-3A8F0EE188C3}"/>
+              </a:ext>
+            </a:extLst>
+          </p:cNvPr>
+          <p:cNvCxnSpPr>
+            <a:cxnSpLocks/>
+          </p:cNvCxnSpPr>
+          <p:nvPr/>
+        </p:nvCxnSpPr>
+        <p:spPr>
+          <a:xfrm flipV="1">
+            <a:off x="303349" y="844463"/>
+            <a:ext cx="258723" cy="60"/>
+          </a:xfrm>
+          <a:prstGeom prst="line">
+            <a:avLst/>
+          </a:prstGeom>
+          <a:ln w="12700"/>
+        </p:spPr>
+        <p:style>
+          <a:lnRef idx="1">
+            <a:schemeClr val="dk1"/>
+          </a:lnRef>
+          <a:fillRef idx="0">
+            <a:schemeClr val="dk1"/>
+          </a:fillRef>
+          <a:effectRef idx="0">
+            <a:schemeClr val="dk1"/>
+          </a:effectRef>
+          <a:fontRef idx="minor">
+            <a:schemeClr val="tx1"/>
+          </a:fontRef>
+        </p:style>
+      </p:cxnSp>
+      <p:cxnSp>
+        <p:nvCxnSpPr>
+          <p:cNvPr id="59" name="Straight Connector 58">
+            <a:extLst>
+              <a:ext uri="{FF2B5EF4-FFF2-40B4-BE49-F238E27FC236}">
+                <a16:creationId xmlns:a16="http://schemas.microsoft.com/office/drawing/2014/main" id="{1C7E6076-1968-4A0F-ADBA-FAF1B7B3CD2E}"/>
+              </a:ext>
+            </a:extLst>
+          </p:cNvPr>
+          <p:cNvCxnSpPr>
+            <a:cxnSpLocks/>
+          </p:cNvCxnSpPr>
+          <p:nvPr/>
+        </p:nvCxnSpPr>
+        <p:spPr>
+          <a:xfrm flipV="1">
+            <a:off x="303349" y="6010962"/>
+            <a:ext cx="258723" cy="60"/>
+          </a:xfrm>
+          <a:prstGeom prst="line">
+            <a:avLst/>
+          </a:prstGeom>
+          <a:ln w="12700"/>
+        </p:spPr>
+        <p:style>
+          <a:lnRef idx="1">
+            <a:schemeClr val="dk1"/>
+          </a:lnRef>
+          <a:fillRef idx="0">
+            <a:schemeClr val="dk1"/>
+          </a:fillRef>
+          <a:effectRef idx="0">
+            <a:schemeClr val="dk1"/>
+          </a:effectRef>
+          <a:fontRef idx="minor">
+            <a:schemeClr val="tx1"/>
+          </a:fontRef>
+        </p:style>
+      </p:cxnSp>
+      <p:cxnSp>
+        <p:nvCxnSpPr>
+          <p:cNvPr id="60" name="Straight Connector 59">
+            <a:extLst>
+              <a:ext uri="{FF2B5EF4-FFF2-40B4-BE49-F238E27FC236}">
+                <a16:creationId xmlns:a16="http://schemas.microsoft.com/office/drawing/2014/main" id="{C7846218-516E-4E85-B491-66AFB8C4A271}"/>
+              </a:ext>
+            </a:extLst>
+          </p:cNvPr>
+          <p:cNvCxnSpPr>
+            <a:cxnSpLocks/>
+          </p:cNvCxnSpPr>
+          <p:nvPr/>
+        </p:nvCxnSpPr>
+        <p:spPr>
+          <a:xfrm>
+            <a:off x="562072" y="6010962"/>
+            <a:ext cx="0" cy="246354"/>
+          </a:xfrm>
+          <a:prstGeom prst="line">
+            <a:avLst/>
+          </a:prstGeom>
+          <a:ln w="12700"/>
+        </p:spPr>
+        <p:style>
+          <a:lnRef idx="1">
+            <a:schemeClr val="dk1"/>
+          </a:lnRef>
+          <a:fillRef idx="0">
+            <a:schemeClr val="dk1"/>
+          </a:fillRef>
+          <a:effectRef idx="0">
+            <a:schemeClr val="dk1"/>
+          </a:effectRef>
+          <a:fontRef idx="minor">
+            <a:schemeClr val="tx1"/>
+          </a:fontRef>
+        </p:style>
+      </p:cxnSp>
+      <p:cxnSp>
+        <p:nvCxnSpPr>
+          <p:cNvPr id="69" name="Straight Connector 68">
+            <a:extLst>
+              <a:ext uri="{FF2B5EF4-FFF2-40B4-BE49-F238E27FC236}">
+                <a16:creationId xmlns:a16="http://schemas.microsoft.com/office/drawing/2014/main" id="{CAB4763A-ECF3-4860-841D-C49F200C8899}"/>
+              </a:ext>
+            </a:extLst>
+          </p:cNvPr>
+          <p:cNvCxnSpPr>
+            <a:cxnSpLocks/>
+          </p:cNvCxnSpPr>
+          <p:nvPr/>
+        </p:nvCxnSpPr>
+        <p:spPr>
+          <a:xfrm flipV="1">
+            <a:off x="2841884" y="3463448"/>
+            <a:ext cx="258723" cy="60"/>
+          </a:xfrm>
+          <a:prstGeom prst="line">
+            <a:avLst/>
+          </a:prstGeom>
+          <a:ln w="25400"/>
+        </p:spPr>
+        <p:style>
+          <a:lnRef idx="1">
+            <a:schemeClr val="dk1"/>
+          </a:lnRef>
+          <a:fillRef idx="0">
+            <a:schemeClr val="dk1"/>
+          </a:fillRef>
+          <a:effectRef idx="0">
+            <a:schemeClr val="dk1"/>
+          </a:effectRef>
+          <a:fontRef idx="minor">
+            <a:schemeClr val="tx1"/>
+          </a:fontRef>
+        </p:style>
+      </p:cxnSp>
+      <p:cxnSp>
+        <p:nvCxnSpPr>
+          <p:cNvPr id="71" name="Straight Connector 70">
+            <a:extLst>
+              <a:ext uri="{FF2B5EF4-FFF2-40B4-BE49-F238E27FC236}">
+                <a16:creationId xmlns:a16="http://schemas.microsoft.com/office/drawing/2014/main" id="{0BCD4541-3EBB-4CE1-BF14-4C0C5ED00E3F}"/>
+              </a:ext>
+            </a:extLst>
+          </p:cNvPr>
+          <p:cNvCxnSpPr>
+            <a:cxnSpLocks/>
+          </p:cNvCxnSpPr>
+          <p:nvPr/>
+        </p:nvCxnSpPr>
+        <p:spPr>
+          <a:xfrm flipV="1">
+            <a:off x="2858137" y="5991800"/>
+            <a:ext cx="258723" cy="60"/>
+          </a:xfrm>
+          <a:prstGeom prst="line">
+            <a:avLst/>
+          </a:prstGeom>
+          <a:ln w="25400"/>
+        </p:spPr>
+        <p:style>
+          <a:lnRef idx="1">
+            <a:schemeClr val="dk1"/>
+          </a:lnRef>
+          <a:fillRef idx="0">
+            <a:schemeClr val="dk1"/>
+          </a:fillRef>
+          <a:effectRef idx="0">
+            <a:schemeClr val="dk1"/>
+          </a:effectRef>
+          <a:fontRef idx="minor">
+            <a:schemeClr val="tx1"/>
+          </a:fontRef>
+        </p:style>
+      </p:cxnSp>
+      <p:cxnSp>
+        <p:nvCxnSpPr>
+          <p:cNvPr id="72" name="Straight Connector 71">
+            <a:extLst>
+              <a:ext uri="{FF2B5EF4-FFF2-40B4-BE49-F238E27FC236}">
+                <a16:creationId xmlns:a16="http://schemas.microsoft.com/office/drawing/2014/main" id="{4E26CEA8-9E6C-4967-A1B4-297A627C71EC}"/>
+              </a:ext>
+            </a:extLst>
+          </p:cNvPr>
+          <p:cNvCxnSpPr>
+            <a:cxnSpLocks/>
+          </p:cNvCxnSpPr>
+          <p:nvPr/>
+        </p:nvCxnSpPr>
+        <p:spPr>
+          <a:xfrm>
+            <a:off x="581905" y="3151190"/>
+            <a:ext cx="0" cy="246354"/>
+          </a:xfrm>
+          <a:prstGeom prst="line">
+            <a:avLst/>
+          </a:prstGeom>
+          <a:ln w="25400"/>
+        </p:spPr>
+        <p:style>
+          <a:lnRef idx="1">
+            <a:schemeClr val="dk1"/>
+          </a:lnRef>
+          <a:fillRef idx="0">
+            <a:schemeClr val="dk1"/>
+          </a:fillRef>
+          <a:effectRef idx="0">
+            <a:schemeClr val="dk1"/>
+          </a:effectRef>
+          <a:fontRef idx="minor">
+            <a:schemeClr val="tx1"/>
+          </a:fontRef>
+        </p:style>
+      </p:cxnSp>
+      <p:cxnSp>
+        <p:nvCxnSpPr>
+          <p:cNvPr id="74" name="Straight Connector 73">
+            <a:extLst>
+              <a:ext uri="{FF2B5EF4-FFF2-40B4-BE49-F238E27FC236}">
+                <a16:creationId xmlns:a16="http://schemas.microsoft.com/office/drawing/2014/main" id="{28E873E7-3448-4FFE-B9BE-023FDD6A34C9}"/>
+              </a:ext>
+            </a:extLst>
+          </p:cNvPr>
+          <p:cNvCxnSpPr>
+            <a:cxnSpLocks/>
+          </p:cNvCxnSpPr>
+          <p:nvPr/>
+        </p:nvCxnSpPr>
+        <p:spPr>
+          <a:xfrm>
+            <a:off x="5731146" y="6010962"/>
+            <a:ext cx="0" cy="246354"/>
+          </a:xfrm>
+          <a:prstGeom prst="line">
+            <a:avLst/>
+          </a:prstGeom>
+          <a:ln w="12700"/>
+        </p:spPr>
+        <p:style>
+          <a:lnRef idx="1">
+            <a:schemeClr val="dk1"/>
+          </a:lnRef>
+          <a:fillRef idx="0">
+            <a:schemeClr val="dk1"/>
+          </a:fillRef>
+          <a:effectRef idx="0">
+            <a:schemeClr val="dk1"/>
+          </a:effectRef>
+          <a:fontRef idx="minor">
+            <a:schemeClr val="tx1"/>
+          </a:fontRef>
+        </p:style>
+      </p:cxnSp>
+      <p:cxnSp>
+        <p:nvCxnSpPr>
+          <p:cNvPr id="75" name="Straight Connector 74">
+            <a:extLst>
+              <a:ext uri="{FF2B5EF4-FFF2-40B4-BE49-F238E27FC236}">
+                <a16:creationId xmlns:a16="http://schemas.microsoft.com/office/drawing/2014/main" id="{47D4E0C0-EDBD-4991-8522-07608B316DF9}"/>
+              </a:ext>
+            </a:extLst>
+          </p:cNvPr>
+          <p:cNvCxnSpPr>
+            <a:cxnSpLocks/>
+          </p:cNvCxnSpPr>
+          <p:nvPr/>
+        </p:nvCxnSpPr>
+        <p:spPr>
+          <a:xfrm>
+            <a:off x="3106484" y="3151190"/>
+            <a:ext cx="0" cy="246354"/>
+          </a:xfrm>
+          <a:prstGeom prst="line">
+            <a:avLst/>
+          </a:prstGeom>
+          <a:ln w="25400"/>
+        </p:spPr>
+        <p:style>
+          <a:lnRef idx="1">
+            <a:schemeClr val="dk1"/>
+          </a:lnRef>
+          <a:fillRef idx="0">
+            <a:schemeClr val="dk1"/>
+          </a:fillRef>
+          <a:effectRef idx="0">
+            <a:schemeClr val="dk1"/>
+          </a:effectRef>
+          <a:fontRef idx="minor">
+            <a:schemeClr val="tx1"/>
+          </a:fontRef>
+        </p:style>
+      </p:cxnSp>
+      <p:cxnSp>
+        <p:nvCxnSpPr>
+          <p:cNvPr id="157" name="Straight Connector 156">
+            <a:extLst>
+              <a:ext uri="{FF2B5EF4-FFF2-40B4-BE49-F238E27FC236}">
+                <a16:creationId xmlns:a16="http://schemas.microsoft.com/office/drawing/2014/main" id="{120F5193-8FE4-45AD-9149-83818B56E3F2}"/>
+              </a:ext>
+            </a:extLst>
+          </p:cNvPr>
+          <p:cNvCxnSpPr>
+            <a:cxnSpLocks/>
+            <a:stCxn id="156" idx="0"/>
+            <a:endCxn id="156" idx="2"/>
+          </p:cNvCxnSpPr>
+          <p:nvPr/>
+        </p:nvCxnSpPr>
+        <p:spPr>
+          <a:xfrm>
+            <a:off x="9052907" y="844463"/>
+            <a:ext cx="0" cy="5169074"/>
+          </a:xfrm>
+          <a:prstGeom prst="line">
+            <a:avLst/>
+          </a:prstGeom>
+          <a:ln w="50800">
+            <a:solidFill>
+              <a:schemeClr val="accent1">
+                <a:lumMod val="75000"/>
+              </a:schemeClr>
+            </a:solidFill>
+          </a:ln>
         </p:spPr>
         <p:style>
           <a:lnRef idx="2">
@@ -3620,29 +4427,35 @@
       </p:cxnSp>
       <p:cxnSp>
         <p:nvCxnSpPr>
-          <p:cNvPr id="14" name="Straight Connector 13">
-            <a:extLst>
-              <a:ext uri="{FF2B5EF4-FFF2-40B4-BE49-F238E27FC236}">
-                <a16:creationId xmlns:a16="http://schemas.microsoft.com/office/drawing/2014/main" id="{127D382D-4729-4A02-B721-14A0DDA86DEA}"/>
+          <p:cNvPr id="158" name="Straight Connector 157">
+            <a:extLst>
+              <a:ext uri="{FF2B5EF4-FFF2-40B4-BE49-F238E27FC236}">
+                <a16:creationId xmlns:a16="http://schemas.microsoft.com/office/drawing/2014/main" id="{E310A7B3-24ED-4349-8843-3A78AF2774FD}"/>
               </a:ext>
             </a:extLst>
           </p:cNvPr>
           <p:cNvCxnSpPr>
             <a:cxnSpLocks/>
-            <a:stCxn id="5" idx="3"/>
-            <a:endCxn id="5" idx="1"/>
+            <a:stCxn id="156" idx="3"/>
+            <a:endCxn id="156" idx="1"/>
           </p:cNvCxnSpPr>
           <p:nvPr/>
         </p:nvCxnSpPr>
         <p:spPr>
           <a:xfrm flipH="1">
-            <a:off x="6271364" y="3429000"/>
+            <a:off x="6468370" y="3429000"/>
             <a:ext cx="5169074" cy="0"/>
           </a:xfrm>
           <a:prstGeom prst="line">
             <a:avLst/>
           </a:prstGeom>
-          <a:ln w="76200"/>
+          <a:ln w="50800">
+            <a:solidFill>
+              <a:schemeClr val="accent1">
+                <a:lumMod val="75000"/>
+              </a:schemeClr>
+            </a:solidFill>
+          </a:ln>
         </p:spPr>
         <p:style>
           <a:lnRef idx="2">
@@ -3661,10 +4474,10 @@
       </p:cxnSp>
       <p:sp>
         <p:nvSpPr>
-          <p:cNvPr id="18" name="TextBox 17">
-            <a:extLst>
-              <a:ext uri="{FF2B5EF4-FFF2-40B4-BE49-F238E27FC236}">
-                <a16:creationId xmlns:a16="http://schemas.microsoft.com/office/drawing/2014/main" id="{06B9ED30-8FFA-49FC-8E36-5CFB09C1B8A8}"/>
+          <p:cNvPr id="159" name="TextBox 158">
+            <a:extLst>
+              <a:ext uri="{FF2B5EF4-FFF2-40B4-BE49-F238E27FC236}">
+                <a16:creationId xmlns:a16="http://schemas.microsoft.com/office/drawing/2014/main" id="{64864106-F529-4137-992D-E2002B8FBDC6}"/>
               </a:ext>
             </a:extLst>
           </p:cNvPr>
@@ -3673,7 +4486,7 @@
         </p:nvSpPr>
         <p:spPr>
           <a:xfrm>
-            <a:off x="1557405" y="1675067"/>
+            <a:off x="7274213" y="1675067"/>
             <a:ext cx="1427966" cy="923330"/>
           </a:xfrm>
           <a:prstGeom prst="rect">
@@ -3690,8 +4503,9 @@
             <a:r>
               <a:rPr lang="en-US" sz="5400" dirty="0">
                 <a:solidFill>
-                  <a:schemeClr val="accent2">
-                    <a:lumMod val="50000"/>
+                  <a:schemeClr val="tx1">
+                    <a:lumMod val="95000"/>
+                    <a:lumOff val="5000"/>
                   </a:schemeClr>
                 </a:solidFill>
               </a:rPr>
@@ -3702,10 +4516,10 @@
       </p:sp>
       <p:sp>
         <p:nvSpPr>
-          <p:cNvPr id="19" name="TextBox 18">
-            <a:extLst>
-              <a:ext uri="{FF2B5EF4-FFF2-40B4-BE49-F238E27FC236}">
-                <a16:creationId xmlns:a16="http://schemas.microsoft.com/office/drawing/2014/main" id="{BC443B8A-6304-4457-8D16-453E4B49F009}"/>
+          <p:cNvPr id="160" name="TextBox 159">
+            <a:extLst>
+              <a:ext uri="{FF2B5EF4-FFF2-40B4-BE49-F238E27FC236}">
+                <a16:creationId xmlns:a16="http://schemas.microsoft.com/office/drawing/2014/main" id="{29A55935-1C20-4B4C-B77D-5B7E66DF9B89}"/>
               </a:ext>
             </a:extLst>
           </p:cNvPr>
@@ -3714,7 +4528,7 @@
         </p:nvSpPr>
         <p:spPr>
           <a:xfrm>
-            <a:off x="3791214" y="1675067"/>
+            <a:off x="9508022" y="1675067"/>
             <a:ext cx="1427966" cy="923330"/>
           </a:xfrm>
           <a:prstGeom prst="rect">
@@ -3731,8 +4545,9 @@
             <a:r>
               <a:rPr lang="en-US" sz="5400" dirty="0">
                 <a:solidFill>
-                  <a:schemeClr val="accent2">
-                    <a:lumMod val="50000"/>
+                  <a:schemeClr val="tx1">
+                    <a:lumMod val="95000"/>
+                    <a:lumOff val="5000"/>
                   </a:schemeClr>
                 </a:solidFill>
               </a:rPr>
@@ -3743,10 +4558,10 @@
       </p:sp>
       <p:sp>
         <p:nvSpPr>
-          <p:cNvPr id="21" name="TextBox 20">
-            <a:extLst>
-              <a:ext uri="{FF2B5EF4-FFF2-40B4-BE49-F238E27FC236}">
-                <a16:creationId xmlns:a16="http://schemas.microsoft.com/office/drawing/2014/main" id="{C66C1388-2A33-45C8-B5B5-19096DB98A0A}"/>
+          <p:cNvPr id="161" name="TextBox 160">
+            <a:extLst>
+              <a:ext uri="{FF2B5EF4-FFF2-40B4-BE49-F238E27FC236}">
+                <a16:creationId xmlns:a16="http://schemas.microsoft.com/office/drawing/2014/main" id="{5D6AA72B-6805-4C6A-B0E3-E7D2122760D7}"/>
               </a:ext>
             </a:extLst>
           </p:cNvPr>
@@ -3755,7 +4570,7 @@
         </p:nvSpPr>
         <p:spPr>
           <a:xfrm>
-            <a:off x="1557405" y="4259604"/>
+            <a:off x="7274213" y="4259604"/>
             <a:ext cx="1427966" cy="923330"/>
           </a:xfrm>
           <a:prstGeom prst="rect">
@@ -3772,8 +4587,9 @@
             <a:r>
               <a:rPr lang="en-US" sz="5400" dirty="0">
                 <a:solidFill>
-                  <a:schemeClr val="accent2">
-                    <a:lumMod val="50000"/>
+                  <a:schemeClr val="tx1">
+                    <a:lumMod val="95000"/>
+                    <a:lumOff val="5000"/>
                   </a:schemeClr>
                 </a:solidFill>
               </a:rPr>
@@ -3784,10 +4600,10 @@
       </p:sp>
       <p:sp>
         <p:nvSpPr>
-          <p:cNvPr id="22" name="TextBox 21">
-            <a:extLst>
-              <a:ext uri="{FF2B5EF4-FFF2-40B4-BE49-F238E27FC236}">
-                <a16:creationId xmlns:a16="http://schemas.microsoft.com/office/drawing/2014/main" id="{E62390B0-6D00-4E07-92EB-1783E9042A87}"/>
+          <p:cNvPr id="162" name="TextBox 161">
+            <a:extLst>
+              <a:ext uri="{FF2B5EF4-FFF2-40B4-BE49-F238E27FC236}">
+                <a16:creationId xmlns:a16="http://schemas.microsoft.com/office/drawing/2014/main" id="{3903A745-E262-4EF0-A2C5-3ACABA500BAD}"/>
               </a:ext>
             </a:extLst>
           </p:cNvPr>
@@ -3796,7 +4612,7 @@
         </p:nvSpPr>
         <p:spPr>
           <a:xfrm>
-            <a:off x="3791214" y="4259604"/>
+            <a:off x="9508022" y="4259604"/>
             <a:ext cx="1427966" cy="923330"/>
           </a:xfrm>
           <a:prstGeom prst="rect">
@@ -3813,8 +4629,9 @@
             <a:r>
               <a:rPr lang="en-US" sz="5400" dirty="0">
                 <a:solidFill>
-                  <a:schemeClr val="accent2">
-                    <a:lumMod val="50000"/>
+                  <a:schemeClr val="tx1">
+                    <a:lumMod val="95000"/>
+                    <a:lumOff val="5000"/>
                   </a:schemeClr>
                 </a:solidFill>
               </a:rPr>
@@ -3823,82 +4640,12 @@
           </a:p>
         </p:txBody>
       </p:sp>
-      <p:sp>
-        <p:nvSpPr>
-          <p:cNvPr id="23" name="TextBox 22">
-            <a:extLst>
-              <a:ext uri="{FF2B5EF4-FFF2-40B4-BE49-F238E27FC236}">
-                <a16:creationId xmlns:a16="http://schemas.microsoft.com/office/drawing/2014/main" id="{7E32F7F6-BC53-4EE8-BB1C-C7E56ACB4A98}"/>
-              </a:ext>
-            </a:extLst>
-          </p:cNvPr>
-          <p:cNvSpPr txBox="1"/>
-          <p:nvPr/>
-        </p:nvSpPr>
-        <p:spPr>
-          <a:xfrm>
-            <a:off x="2055139" y="0"/>
-            <a:ext cx="2561920" cy="1015663"/>
-          </a:xfrm>
-          <a:prstGeom prst="rect">
-            <a:avLst/>
-          </a:prstGeom>
-          <a:noFill/>
-        </p:spPr>
-        <p:txBody>
-          <a:bodyPr wrap="none" rtlCol="0">
-            <a:spAutoFit/>
-          </a:bodyPr>
-          <a:lstStyle/>
-          <a:p>
-            <a:r>
-              <a:rPr lang="en-US" sz="6000" dirty="0"/>
-              <a:t>NSLEDS</a:t>
-            </a:r>
-          </a:p>
-        </p:txBody>
-      </p:sp>
-      <p:sp>
-        <p:nvSpPr>
-          <p:cNvPr id="24" name="TextBox 23">
-            <a:extLst>
-              <a:ext uri="{FF2B5EF4-FFF2-40B4-BE49-F238E27FC236}">
-                <a16:creationId xmlns:a16="http://schemas.microsoft.com/office/drawing/2014/main" id="{8DA04338-6912-4E20-9DE1-EB82B362D0DA}"/>
-              </a:ext>
-            </a:extLst>
-          </p:cNvPr>
-          <p:cNvSpPr txBox="1"/>
-          <p:nvPr/>
-        </p:nvSpPr>
-        <p:spPr>
-          <a:xfrm>
-            <a:off x="7574941" y="0"/>
-            <a:ext cx="2502608" cy="1015663"/>
-          </a:xfrm>
-          <a:prstGeom prst="rect">
-            <a:avLst/>
-          </a:prstGeom>
-          <a:noFill/>
-        </p:spPr>
-        <p:txBody>
-          <a:bodyPr wrap="none" rtlCol="0">
-            <a:spAutoFit/>
-          </a:bodyPr>
-          <a:lstStyle/>
-          <a:p>
-            <a:r>
-              <a:rPr lang="en-US" sz="6000" dirty="0"/>
-              <a:t>HDILED</a:t>
-            </a:r>
-          </a:p>
-        </p:txBody>
-      </p:sp>
       <p:cxnSp>
         <p:nvCxnSpPr>
-          <p:cNvPr id="26" name="Straight Arrow Connector 25">
-            <a:extLst>
-              <a:ext uri="{FF2B5EF4-FFF2-40B4-BE49-F238E27FC236}">
-                <a16:creationId xmlns:a16="http://schemas.microsoft.com/office/drawing/2014/main" id="{DBCB53F8-908F-44C1-BF60-EA0A1267EF47}"/>
+          <p:cNvPr id="163" name="Straight Arrow Connector 162">
+            <a:extLst>
+              <a:ext uri="{FF2B5EF4-FFF2-40B4-BE49-F238E27FC236}">
+                <a16:creationId xmlns:a16="http://schemas.microsoft.com/office/drawing/2014/main" id="{DEC7BEC8-B0CE-415E-8472-C0118F64BC5F}"/>
               </a:ext>
             </a:extLst>
           </p:cNvPr>
@@ -3909,7 +4656,7 @@
         </p:nvCxnSpPr>
         <p:spPr>
           <a:xfrm>
-            <a:off x="751562" y="6154664"/>
+            <a:off x="6468370" y="6154664"/>
             <a:ext cx="5169074" cy="0"/>
           </a:xfrm>
           <a:prstGeom prst="straightConnector1">
@@ -3937,10 +4684,10 @@
       </p:cxnSp>
       <p:cxnSp>
         <p:nvCxnSpPr>
-          <p:cNvPr id="29" name="Straight Arrow Connector 28">
-            <a:extLst>
-              <a:ext uri="{FF2B5EF4-FFF2-40B4-BE49-F238E27FC236}">
-                <a16:creationId xmlns:a16="http://schemas.microsoft.com/office/drawing/2014/main" id="{EA22759E-7280-4027-9EA6-573BC41894E0}"/>
+          <p:cNvPr id="164" name="Straight Arrow Connector 163">
+            <a:extLst>
+              <a:ext uri="{FF2B5EF4-FFF2-40B4-BE49-F238E27FC236}">
+                <a16:creationId xmlns:a16="http://schemas.microsoft.com/office/drawing/2014/main" id="{32D129B0-91FD-4AAA-97AF-E6FF94C44791}"/>
               </a:ext>
             </a:extLst>
           </p:cNvPr>
@@ -3951,7 +4698,7 @@
         </p:nvCxnSpPr>
         <p:spPr>
           <a:xfrm>
-            <a:off x="632565" y="844463"/>
+            <a:off x="6349373" y="844463"/>
             <a:ext cx="0" cy="5169074"/>
           </a:xfrm>
           <a:prstGeom prst="straightConnector1">
@@ -3979,10 +4726,10 @@
       </p:cxnSp>
       <p:sp>
         <p:nvSpPr>
-          <p:cNvPr id="32" name="TextBox 31">
-            <a:extLst>
-              <a:ext uri="{FF2B5EF4-FFF2-40B4-BE49-F238E27FC236}">
-                <a16:creationId xmlns:a16="http://schemas.microsoft.com/office/drawing/2014/main" id="{8025E061-C92D-4ECA-B360-3B052FC9CF78}"/>
+          <p:cNvPr id="165" name="TextBox 164">
+            <a:extLst>
+              <a:ext uri="{FF2B5EF4-FFF2-40B4-BE49-F238E27FC236}">
+                <a16:creationId xmlns:a16="http://schemas.microsoft.com/office/drawing/2014/main" id="{A46899F1-73A6-4339-AC39-7A7B3B27B5C4}"/>
               </a:ext>
             </a:extLst>
           </p:cNvPr>
@@ -3991,7 +4738,7 @@
         </p:nvSpPr>
         <p:spPr>
           <a:xfrm rot="16200000">
-            <a:off x="57916" y="3198167"/>
+            <a:off x="5774725" y="3198167"/>
             <a:ext cx="806631" cy="461665"/>
           </a:xfrm>
           <a:prstGeom prst="rect">
@@ -4007,52 +4754,17 @@
           <a:p>
             <a:r>
               <a:rPr lang="en-US" sz="2400" dirty="0"/>
-              <a:t>1024</a:t>
-            </a:r>
-          </a:p>
-        </p:txBody>
-      </p:sp>
-      <p:sp>
-        <p:nvSpPr>
-          <p:cNvPr id="33" name="TextBox 32">
-            <a:extLst>
-              <a:ext uri="{FF2B5EF4-FFF2-40B4-BE49-F238E27FC236}">
-                <a16:creationId xmlns:a16="http://schemas.microsoft.com/office/drawing/2014/main" id="{7FA4C87D-B1B7-4AF0-A368-6645A8032AAB}"/>
-              </a:ext>
-            </a:extLst>
-          </p:cNvPr>
-          <p:cNvSpPr txBox="1"/>
-          <p:nvPr/>
-        </p:nvSpPr>
-        <p:spPr>
-          <a:xfrm>
-            <a:off x="2938613" y="6120217"/>
-            <a:ext cx="806631" cy="461665"/>
-          </a:xfrm>
-          <a:prstGeom prst="rect">
-            <a:avLst/>
-          </a:prstGeom>
-          <a:noFill/>
-        </p:spPr>
-        <p:txBody>
-          <a:bodyPr wrap="none" rtlCol="0">
-            <a:spAutoFit/>
-          </a:bodyPr>
-          <a:lstStyle/>
-          <a:p>
-            <a:r>
-              <a:rPr lang="en-US" sz="2400" dirty="0"/>
-              <a:t>1024</a:t>
+              <a:t>2048</a:t>
             </a:r>
           </a:p>
         </p:txBody>
       </p:sp>
       <p:cxnSp>
         <p:nvCxnSpPr>
-          <p:cNvPr id="34" name="Straight Arrow Connector 33">
-            <a:extLst>
-              <a:ext uri="{FF2B5EF4-FFF2-40B4-BE49-F238E27FC236}">
-                <a16:creationId xmlns:a16="http://schemas.microsoft.com/office/drawing/2014/main" id="{6B508208-E172-467A-9D6E-26472B6119FF}"/>
+          <p:cNvPr id="166" name="Straight Arrow Connector 165">
+            <a:extLst>
+              <a:ext uri="{FF2B5EF4-FFF2-40B4-BE49-F238E27FC236}">
+                <a16:creationId xmlns:a16="http://schemas.microsoft.com/office/drawing/2014/main" id="{87ADA901-1E0B-4372-A65F-2A042A8A30E4}"/>
               </a:ext>
             </a:extLst>
           </p:cNvPr>
@@ -4063,7 +4775,7 @@
         </p:nvCxnSpPr>
         <p:spPr>
           <a:xfrm>
-            <a:off x="771395" y="3276600"/>
+            <a:off x="6488203" y="3276600"/>
             <a:ext cx="2518702" cy="0"/>
           </a:xfrm>
           <a:prstGeom prst="straightConnector1">
@@ -4091,10 +4803,10 @@
       </p:cxnSp>
       <p:sp>
         <p:nvSpPr>
-          <p:cNvPr id="39" name="TextBox 38">
-            <a:extLst>
-              <a:ext uri="{FF2B5EF4-FFF2-40B4-BE49-F238E27FC236}">
-                <a16:creationId xmlns:a16="http://schemas.microsoft.com/office/drawing/2014/main" id="{3DCBDF0A-1EA9-465F-802E-804976EAA2A9}"/>
+          <p:cNvPr id="167" name="TextBox 166">
+            <a:extLst>
+              <a:ext uri="{FF2B5EF4-FFF2-40B4-BE49-F238E27FC236}">
+                <a16:creationId xmlns:a16="http://schemas.microsoft.com/office/drawing/2014/main" id="{60F2290C-F327-4039-AA76-E1BA5A39E7AF}"/>
               </a:ext>
             </a:extLst>
           </p:cNvPr>
@@ -4103,8 +4815,8 @@
         </p:nvSpPr>
         <p:spPr>
           <a:xfrm>
-            <a:off x="1651823" y="2885744"/>
-            <a:ext cx="651140" cy="461665"/>
+            <a:off x="7368631" y="2885744"/>
+            <a:ext cx="806631" cy="461665"/>
           </a:xfrm>
           <a:prstGeom prst="rect">
             <a:avLst/>
@@ -4119,17 +4831,17 @@
           <a:p>
             <a:r>
               <a:rPr lang="en-US" sz="2400" dirty="0"/>
-              <a:t>512</a:t>
+              <a:t>1024</a:t>
             </a:r>
           </a:p>
         </p:txBody>
       </p:sp>
       <p:cxnSp>
         <p:nvCxnSpPr>
-          <p:cNvPr id="40" name="Straight Arrow Connector 39">
-            <a:extLst>
-              <a:ext uri="{FF2B5EF4-FFF2-40B4-BE49-F238E27FC236}">
-                <a16:creationId xmlns:a16="http://schemas.microsoft.com/office/drawing/2014/main" id="{D62D9623-E34B-4C5F-BF3A-14938EBA7C19}"/>
+          <p:cNvPr id="168" name="Straight Arrow Connector 167">
+            <a:extLst>
+              <a:ext uri="{FF2B5EF4-FFF2-40B4-BE49-F238E27FC236}">
+                <a16:creationId xmlns:a16="http://schemas.microsoft.com/office/drawing/2014/main" id="{8632DDD0-3F47-420A-9DD6-6EC3A7827C62}"/>
               </a:ext>
             </a:extLst>
           </p:cNvPr>
@@ -4140,7 +4852,7 @@
         </p:nvCxnSpPr>
         <p:spPr>
           <a:xfrm>
-            <a:off x="3155441" y="3469700"/>
+            <a:off x="8872249" y="3469700"/>
             <a:ext cx="0" cy="2522100"/>
           </a:xfrm>
           <a:prstGeom prst="straightConnector1">
@@ -4168,10 +4880,10 @@
       </p:cxnSp>
       <p:sp>
         <p:nvSpPr>
-          <p:cNvPr id="47" name="TextBox 46">
-            <a:extLst>
-              <a:ext uri="{FF2B5EF4-FFF2-40B4-BE49-F238E27FC236}">
-                <a16:creationId xmlns:a16="http://schemas.microsoft.com/office/drawing/2014/main" id="{185C6769-3FD4-4507-ADEA-E68ED067EA96}"/>
+          <p:cNvPr id="169" name="TextBox 168">
+            <a:extLst>
+              <a:ext uri="{FF2B5EF4-FFF2-40B4-BE49-F238E27FC236}">
+                <a16:creationId xmlns:a16="http://schemas.microsoft.com/office/drawing/2014/main" id="{F35003D8-1D22-4667-AA29-B6E614ED5646}"/>
               </a:ext>
             </a:extLst>
           </p:cNvPr>
@@ -4180,8 +4892,8 @@
         </p:nvSpPr>
         <p:spPr>
           <a:xfrm rot="16200000">
-            <a:off x="2640867" y="4514630"/>
-            <a:ext cx="651140" cy="461665"/>
+            <a:off x="8279931" y="4514630"/>
+            <a:ext cx="806631" cy="461665"/>
           </a:xfrm>
           <a:prstGeom prst="rect">
             <a:avLst/>
@@ -4196,17 +4908,17 @@
           <a:p>
             <a:r>
               <a:rPr lang="en-US" sz="2400" dirty="0"/>
-              <a:t>512</a:t>
+              <a:t>1024</a:t>
             </a:r>
           </a:p>
         </p:txBody>
       </p:sp>
       <p:cxnSp>
         <p:nvCxnSpPr>
-          <p:cNvPr id="53" name="Straight Connector 52">
-            <a:extLst>
-              <a:ext uri="{FF2B5EF4-FFF2-40B4-BE49-F238E27FC236}">
-                <a16:creationId xmlns:a16="http://schemas.microsoft.com/office/drawing/2014/main" id="{4EA2669F-1093-40D2-98B3-3A8F0EE188C3}"/>
+          <p:cNvPr id="170" name="Straight Connector 169">
+            <a:extLst>
+              <a:ext uri="{FF2B5EF4-FFF2-40B4-BE49-F238E27FC236}">
+                <a16:creationId xmlns:a16="http://schemas.microsoft.com/office/drawing/2014/main" id="{F5094DE8-57DD-4C09-8FF9-36DD29B07EDD}"/>
               </a:ext>
             </a:extLst>
           </p:cNvPr>
@@ -4217,13 +4929,13 @@
         </p:nvCxnSpPr>
         <p:spPr>
           <a:xfrm flipV="1">
-            <a:off x="492839" y="844463"/>
+            <a:off x="6209647" y="844463"/>
             <a:ext cx="258723" cy="60"/>
           </a:xfrm>
           <a:prstGeom prst="line">
             <a:avLst/>
           </a:prstGeom>
-          <a:ln w="25400"/>
+          <a:ln w="12700"/>
         </p:spPr>
         <p:style>
           <a:lnRef idx="1">
@@ -4242,10 +4954,10 @@
       </p:cxnSp>
       <p:cxnSp>
         <p:nvCxnSpPr>
-          <p:cNvPr id="59" name="Straight Connector 58">
-            <a:extLst>
-              <a:ext uri="{FF2B5EF4-FFF2-40B4-BE49-F238E27FC236}">
-                <a16:creationId xmlns:a16="http://schemas.microsoft.com/office/drawing/2014/main" id="{1C7E6076-1968-4A0F-ADBA-FAF1B7B3CD2E}"/>
+          <p:cNvPr id="171" name="Straight Connector 170">
+            <a:extLst>
+              <a:ext uri="{FF2B5EF4-FFF2-40B4-BE49-F238E27FC236}">
+                <a16:creationId xmlns:a16="http://schemas.microsoft.com/office/drawing/2014/main" id="{12F26643-AE0A-4F56-A1ED-D2D72609144F}"/>
               </a:ext>
             </a:extLst>
           </p:cNvPr>
@@ -4256,13 +4968,13 @@
         </p:nvCxnSpPr>
         <p:spPr>
           <a:xfrm flipV="1">
-            <a:off x="492839" y="6010962"/>
+            <a:off x="6209647" y="6010962"/>
             <a:ext cx="258723" cy="60"/>
           </a:xfrm>
           <a:prstGeom prst="line">
             <a:avLst/>
           </a:prstGeom>
-          <a:ln w="25400"/>
+          <a:ln w="12700"/>
         </p:spPr>
         <p:style>
           <a:lnRef idx="1">
@@ -4281,10 +4993,10 @@
       </p:cxnSp>
       <p:cxnSp>
         <p:nvCxnSpPr>
-          <p:cNvPr id="60" name="Straight Connector 59">
-            <a:extLst>
-              <a:ext uri="{FF2B5EF4-FFF2-40B4-BE49-F238E27FC236}">
-                <a16:creationId xmlns:a16="http://schemas.microsoft.com/office/drawing/2014/main" id="{C7846218-516E-4E85-B491-66AFB8C4A271}"/>
+          <p:cNvPr id="172" name="Straight Connector 171">
+            <a:extLst>
+              <a:ext uri="{FF2B5EF4-FFF2-40B4-BE49-F238E27FC236}">
+                <a16:creationId xmlns:a16="http://schemas.microsoft.com/office/drawing/2014/main" id="{4F9E73D9-446C-4C49-868C-657CAD0AE7EF}"/>
               </a:ext>
             </a:extLst>
           </p:cNvPr>
@@ -4295,13 +5007,13 @@
         </p:nvCxnSpPr>
         <p:spPr>
           <a:xfrm>
-            <a:off x="751562" y="6010962"/>
+            <a:off x="6468370" y="6010962"/>
             <a:ext cx="0" cy="246354"/>
           </a:xfrm>
           <a:prstGeom prst="line">
             <a:avLst/>
           </a:prstGeom>
-          <a:ln w="25400"/>
+          <a:ln w="12700"/>
         </p:spPr>
         <p:style>
           <a:lnRef idx="1">
@@ -4320,10 +5032,10 @@
       </p:cxnSp>
       <p:cxnSp>
         <p:nvCxnSpPr>
-          <p:cNvPr id="69" name="Straight Connector 68">
-            <a:extLst>
-              <a:ext uri="{FF2B5EF4-FFF2-40B4-BE49-F238E27FC236}">
-                <a16:creationId xmlns:a16="http://schemas.microsoft.com/office/drawing/2014/main" id="{CAB4763A-ECF3-4860-841D-C49F200C8899}"/>
+          <p:cNvPr id="173" name="Straight Connector 172">
+            <a:extLst>
+              <a:ext uri="{FF2B5EF4-FFF2-40B4-BE49-F238E27FC236}">
+                <a16:creationId xmlns:a16="http://schemas.microsoft.com/office/drawing/2014/main" id="{A7262EA3-9BAA-4C63-BA89-40322572112F}"/>
               </a:ext>
             </a:extLst>
           </p:cNvPr>
@@ -4334,7 +5046,7 @@
         </p:nvCxnSpPr>
         <p:spPr>
           <a:xfrm flipV="1">
-            <a:off x="3031374" y="3463448"/>
+            <a:off x="8748182" y="3463448"/>
             <a:ext cx="258723" cy="60"/>
           </a:xfrm>
           <a:prstGeom prst="line">
@@ -4359,10 +5071,10 @@
       </p:cxnSp>
       <p:cxnSp>
         <p:nvCxnSpPr>
-          <p:cNvPr id="71" name="Straight Connector 70">
-            <a:extLst>
-              <a:ext uri="{FF2B5EF4-FFF2-40B4-BE49-F238E27FC236}">
-                <a16:creationId xmlns:a16="http://schemas.microsoft.com/office/drawing/2014/main" id="{0BCD4541-3EBB-4CE1-BF14-4C0C5ED00E3F}"/>
+          <p:cNvPr id="174" name="Straight Connector 173">
+            <a:extLst>
+              <a:ext uri="{FF2B5EF4-FFF2-40B4-BE49-F238E27FC236}">
+                <a16:creationId xmlns:a16="http://schemas.microsoft.com/office/drawing/2014/main" id="{1ADB5C1D-2E02-43F7-BDB9-2A2B3E036BF2}"/>
               </a:ext>
             </a:extLst>
           </p:cNvPr>
@@ -4373,7 +5085,7 @@
         </p:nvCxnSpPr>
         <p:spPr>
           <a:xfrm flipV="1">
-            <a:off x="3047627" y="5991800"/>
+            <a:off x="8764435" y="5991800"/>
             <a:ext cx="258723" cy="60"/>
           </a:xfrm>
           <a:prstGeom prst="line">
@@ -4398,10 +5110,10 @@
       </p:cxnSp>
       <p:cxnSp>
         <p:nvCxnSpPr>
-          <p:cNvPr id="72" name="Straight Connector 71">
-            <a:extLst>
-              <a:ext uri="{FF2B5EF4-FFF2-40B4-BE49-F238E27FC236}">
-                <a16:creationId xmlns:a16="http://schemas.microsoft.com/office/drawing/2014/main" id="{4E26CEA8-9E6C-4967-A1B4-297A627C71EC}"/>
+          <p:cNvPr id="175" name="Straight Connector 174">
+            <a:extLst>
+              <a:ext uri="{FF2B5EF4-FFF2-40B4-BE49-F238E27FC236}">
+                <a16:creationId xmlns:a16="http://schemas.microsoft.com/office/drawing/2014/main" id="{5BB0D792-FBBB-413C-8B60-18F458782923}"/>
               </a:ext>
             </a:extLst>
           </p:cNvPr>
@@ -4412,7 +5124,7 @@
         </p:nvCxnSpPr>
         <p:spPr>
           <a:xfrm>
-            <a:off x="771395" y="3151190"/>
+            <a:off x="6488203" y="3151190"/>
             <a:ext cx="0" cy="246354"/>
           </a:xfrm>
           <a:prstGeom prst="line">
@@ -4437,10 +5149,10 @@
       </p:cxnSp>
       <p:cxnSp>
         <p:nvCxnSpPr>
-          <p:cNvPr id="74" name="Straight Connector 73">
-            <a:extLst>
-              <a:ext uri="{FF2B5EF4-FFF2-40B4-BE49-F238E27FC236}">
-                <a16:creationId xmlns:a16="http://schemas.microsoft.com/office/drawing/2014/main" id="{28E873E7-3448-4FFE-B9BE-023FDD6A34C9}"/>
+          <p:cNvPr id="176" name="Straight Connector 175">
+            <a:extLst>
+              <a:ext uri="{FF2B5EF4-FFF2-40B4-BE49-F238E27FC236}">
+                <a16:creationId xmlns:a16="http://schemas.microsoft.com/office/drawing/2014/main" id="{1D814561-4DAC-4FB5-A476-637B79647F7D}"/>
               </a:ext>
             </a:extLst>
           </p:cNvPr>
@@ -4451,13 +5163,13 @@
         </p:nvCxnSpPr>
         <p:spPr>
           <a:xfrm>
-            <a:off x="5920636" y="6010962"/>
+            <a:off x="11637444" y="6010962"/>
             <a:ext cx="0" cy="246354"/>
           </a:xfrm>
           <a:prstGeom prst="line">
             <a:avLst/>
           </a:prstGeom>
-          <a:ln w="25400"/>
+          <a:ln w="12700"/>
         </p:spPr>
         <p:style>
           <a:lnRef idx="1">
@@ -4476,10 +5188,10 @@
       </p:cxnSp>
       <p:cxnSp>
         <p:nvCxnSpPr>
-          <p:cNvPr id="75" name="Straight Connector 74">
-            <a:extLst>
-              <a:ext uri="{FF2B5EF4-FFF2-40B4-BE49-F238E27FC236}">
-                <a16:creationId xmlns:a16="http://schemas.microsoft.com/office/drawing/2014/main" id="{47D4E0C0-EDBD-4991-8522-07608B316DF9}"/>
+          <p:cNvPr id="177" name="Straight Connector 176">
+            <a:extLst>
+              <a:ext uri="{FF2B5EF4-FFF2-40B4-BE49-F238E27FC236}">
+                <a16:creationId xmlns:a16="http://schemas.microsoft.com/office/drawing/2014/main" id="{5E447F2D-5E95-48D4-962C-334D3EFAEFC7}"/>
               </a:ext>
             </a:extLst>
           </p:cNvPr>
@@ -4490,7 +5202,7 @@
         </p:nvCxnSpPr>
         <p:spPr>
           <a:xfrm>
-            <a:off x="3295974" y="3151190"/>
+            <a:off x="9012782" y="3151190"/>
             <a:ext cx="0" cy="246354"/>
           </a:xfrm>
           <a:prstGeom prst="line">
@@ -4513,6 +5225,41 @@
           </a:fontRef>
         </p:style>
       </p:cxnSp>
+      <p:sp>
+        <p:nvSpPr>
+          <p:cNvPr id="180" name="TextBox 179">
+            <a:extLst>
+              <a:ext uri="{FF2B5EF4-FFF2-40B4-BE49-F238E27FC236}">
+                <a16:creationId xmlns:a16="http://schemas.microsoft.com/office/drawing/2014/main" id="{528D96F5-0BD4-4148-99F5-A3047831574C}"/>
+              </a:ext>
+            </a:extLst>
+          </p:cNvPr>
+          <p:cNvSpPr txBox="1"/>
+          <p:nvPr/>
+        </p:nvSpPr>
+        <p:spPr>
+          <a:xfrm>
+            <a:off x="8649591" y="6074343"/>
+            <a:ext cx="806631" cy="461665"/>
+          </a:xfrm>
+          <a:prstGeom prst="rect">
+            <a:avLst/>
+          </a:prstGeom>
+          <a:noFill/>
+        </p:spPr>
+        <p:txBody>
+          <a:bodyPr wrap="none" rtlCol="0">
+            <a:spAutoFit/>
+          </a:bodyPr>
+          <a:lstStyle/>
+          <a:p>
+            <a:r>
+              <a:rPr lang="en-US" sz="2400" dirty="0"/>
+              <a:t>2048</a:t>
+            </a:r>
+          </a:p>
+        </p:txBody>
+      </p:sp>
     </p:spTree>
     <p:extLst>
       <p:ext uri="{BB962C8B-B14F-4D97-AF65-F5344CB8AC3E}">

</xml_diff>